<commit_message>
Discover step now outputs cell line/disease rankings to the patient's directory
</commit_message>
<xml_diff>
--- a/Notebooks/patients/BT084/BT084.mtb_slides.pptx
+++ b/Notebooks/patients/BT084/BT084.mtb_slides.pptx
@@ -37,6 +37,7 @@
     <p:sldId id="285" r:id="rId36"/>
     <p:sldId id="286" r:id="rId37"/>
     <p:sldId id="287" r:id="rId38"/>
+    <p:sldId id="288" r:id="rId39"/>
   </p:sldIdLst>
   <p:sldSz cx="9144000" cy="6858000" type="screen4x3"/>
   <p:notesSz cx="6858000" cy="9144000"/>
@@ -42037,6 +42038,1374 @@
 </p:sld>
 </file>
 
+<file path=ppt/slides/slide33.xml><?xml version="1.0" encoding="utf-8"?>
+<p:sld xmlns:a="http://schemas.openxmlformats.org/drawingml/2006/main" xmlns:p="http://schemas.openxmlformats.org/presentationml/2006/main" xmlns:r="http://schemas.openxmlformats.org/officeDocument/2006/relationships">
+  <p:cSld>
+    <p:spTree>
+      <p:nvGrpSpPr>
+        <p:cNvPr id="1" name=""/>
+        <p:cNvGrpSpPr/>
+        <p:nvPr/>
+      </p:nvGrpSpPr>
+      <p:grpSpPr/>
+      <p:sp>
+        <p:nvSpPr>
+          <p:cNvPr id="2" name="TextBox 1"/>
+          <p:cNvSpPr txBox="1"/>
+          <p:nvPr/>
+        </p:nvSpPr>
+        <p:spPr>
+          <a:xfrm>
+            <a:off x="0" y="0"/>
+            <a:ext cx="9144000" cy="685800"/>
+          </a:xfrm>
+          <a:prstGeom prst="rect">
+            <a:avLst/>
+          </a:prstGeom>
+          <a:noFill/>
+        </p:spPr>
+        <p:txBody>
+          <a:bodyPr wrap="none">
+            <a:spAutoFit/>
+          </a:bodyPr>
+          <a:lstStyle/>
+          <a:p/>
+          <a:p>
+            <a:pPr>
+              <a:defRPr sz="2600"/>
+            </a:pPr>
+            <a:r>
+              <a:t>DiSCoVER: top drugs (cerebellar stem cell control)</a:t>
+            </a:r>
+          </a:p>
+        </p:txBody>
+      </p:sp>
+      <p:graphicFrame>
+        <p:nvGraphicFramePr>
+          <p:cNvPr id="3" name="Table 2"/>
+          <p:cNvGraphicFramePr>
+            <a:graphicFrameLocks noGrp="1"/>
+          </p:cNvGraphicFramePr>
+          <p:nvPr/>
+        </p:nvGraphicFramePr>
+        <p:xfrm>
+          <a:off x="411480" y="777240"/>
+          <a:ext cx="8275320" cy="4114800"/>
+        </p:xfrm>
+        <a:graphic>
+          <a:graphicData uri="http://schemas.openxmlformats.org/drawingml/2006/table">
+            <a:tbl>
+              <a:tblPr firstRow="1" bandRow="1">
+                <a:tableStyleId>{5C22544A-7EE6-4342-B048-85BDC9FD1C3A}</a:tableStyleId>
+              </a:tblPr>
+              <a:tblGrid>
+                <a:gridCol w="1005840"/>
+                <a:gridCol w="731520"/>
+                <a:gridCol w="1051560"/>
+                <a:gridCol w="5486400"/>
+              </a:tblGrid>
+              <a:tr h="195942">
+                <a:tc>
+                  <a:txBody>
+                    <a:bodyPr/>
+                    <a:lstStyle/>
+                    <a:p>
+                      <a:r>
+                        <a:t>Drug</a:t>
+                      </a:r>
+                    </a:p>
+                  </a:txBody>
+                  <a:tcPr/>
+                </a:tc>
+                <a:tc>
+                  <a:txBody>
+                    <a:bodyPr/>
+                    <a:lstStyle/>
+                    <a:p>
+                      <a:r>
+                        <a:t>Score</a:t>
+                      </a:r>
+                    </a:p>
+                  </a:txBody>
+                  <a:tcPr/>
+                </a:tc>
+                <a:tc>
+                  <a:txBody>
+                    <a:bodyPr/>
+                    <a:lstStyle/>
+                    <a:p>
+                      <a:r>
+                        <a:t>Evidence</a:t>
+                      </a:r>
+                    </a:p>
+                  </a:txBody>
+                  <a:tcPr/>
+                </a:tc>
+                <a:tc>
+                  <a:txBody>
+                    <a:bodyPr/>
+                    <a:lstStyle/>
+                    <a:p>
+                      <a:r>
+                        <a:t>Mechanism of action</a:t>
+                      </a:r>
+                    </a:p>
+                  </a:txBody>
+                  <a:tcPr/>
+                </a:tc>
+              </a:tr>
+              <a:tr h="195942">
+                <a:tc>
+                  <a:txBody>
+                    <a:bodyPr/>
+                    <a:lstStyle/>
+                    <a:p>
+                      <a:pPr>
+                        <a:defRPr sz="1050"/>
+                      </a:pPr>
+                      <a:r>
+                        <a:t>tl-2-105</a:t>
+                      </a:r>
+                    </a:p>
+                  </a:txBody>
+                  <a:tcPr/>
+                </a:tc>
+                <a:tc>
+                  <a:txBody>
+                    <a:bodyPr/>
+                    <a:lstStyle/>
+                    <a:p>
+                      <a:pPr>
+                        <a:defRPr sz="1050"/>
+                      </a:pPr>
+                      <a:r>
+                        <a:t>0.65</a:t>
+                      </a:r>
+                    </a:p>
+                  </a:txBody>
+                  <a:tcPr/>
+                </a:tc>
+                <a:tc>
+                  <a:txBody>
+                    <a:bodyPr/>
+                    <a:lstStyle/>
+                    <a:p>
+                      <a:pPr>
+                        <a:defRPr sz="1050"/>
+                      </a:pPr>
+                      <a:r>
+                        <a:t>+..</a:t>
+                      </a:r>
+                    </a:p>
+                  </a:txBody>
+                  <a:tcPr/>
+                </a:tc>
+                <a:tc>
+                  <a:txBody>
+                    <a:bodyPr/>
+                    <a:lstStyle/>
+                    <a:p>
+                      <a:pPr>
+                        <a:defRPr sz="1050"/>
+                      </a:pPr>
+                      <a:r>
+                        <a:t>Not Clinically Relevant</a:t>
+                      </a:r>
+                    </a:p>
+                  </a:txBody>
+                  <a:tcPr/>
+                </a:tc>
+              </a:tr>
+              <a:tr h="195942">
+                <a:tc>
+                  <a:txBody>
+                    <a:bodyPr/>
+                    <a:lstStyle/>
+                    <a:p>
+                      <a:pPr>
+                        <a:defRPr sz="1050"/>
+                      </a:pPr>
+                      <a:r>
+                        <a:t>sb52334</a:t>
+                      </a:r>
+                    </a:p>
+                  </a:txBody>
+                  <a:tcPr/>
+                </a:tc>
+                <a:tc>
+                  <a:txBody>
+                    <a:bodyPr/>
+                    <a:lstStyle/>
+                    <a:p>
+                      <a:pPr>
+                        <a:defRPr sz="1050"/>
+                      </a:pPr>
+                      <a:r>
+                        <a:t>0.62</a:t>
+                      </a:r>
+                    </a:p>
+                  </a:txBody>
+                  <a:tcPr/>
+                </a:tc>
+                <a:tc>
+                  <a:txBody>
+                    <a:bodyPr/>
+                    <a:lstStyle/>
+                    <a:p>
+                      <a:pPr>
+                        <a:defRPr sz="1050"/>
+                      </a:pPr>
+                      <a:r>
+                        <a:t>+..</a:t>
+                      </a:r>
+                    </a:p>
+                  </a:txBody>
+                  <a:tcPr/>
+                </a:tc>
+                <a:tc>
+                  <a:txBody>
+                    <a:bodyPr/>
+                    <a:lstStyle/>
+                    <a:p>
+                      <a:pPr>
+                        <a:defRPr sz="1050"/>
+                      </a:pPr>
+                      <a:r>
+                        <a:t>Not Clinically Relevant</a:t>
+                      </a:r>
+                    </a:p>
+                  </a:txBody>
+                  <a:tcPr/>
+                </a:tc>
+              </a:tr>
+              <a:tr h="195942">
+                <a:tc>
+                  <a:txBody>
+                    <a:bodyPr/>
+                    <a:lstStyle/>
+                    <a:p>
+                      <a:pPr>
+                        <a:defRPr sz="1050"/>
+                      </a:pPr>
+                      <a:r>
+                        <a:t>gsk1070916</a:t>
+                      </a:r>
+                    </a:p>
+                  </a:txBody>
+                  <a:tcPr/>
+                </a:tc>
+                <a:tc>
+                  <a:txBody>
+                    <a:bodyPr/>
+                    <a:lstStyle/>
+                    <a:p>
+                      <a:pPr>
+                        <a:defRPr sz="1050"/>
+                      </a:pPr>
+                      <a:r>
+                        <a:t>0.61</a:t>
+                      </a:r>
+                    </a:p>
+                  </a:txBody>
+                  <a:tcPr/>
+                </a:tc>
+                <a:tc>
+                  <a:txBody>
+                    <a:bodyPr/>
+                    <a:lstStyle/>
+                    <a:p>
+                      <a:pPr>
+                        <a:defRPr sz="1050"/>
+                      </a:pPr>
+                      <a:r>
+                        <a:t>+..</a:t>
+                      </a:r>
+                    </a:p>
+                  </a:txBody>
+                  <a:tcPr/>
+                </a:tc>
+                <a:tc>
+                  <a:txBody>
+                    <a:bodyPr/>
+                    <a:lstStyle/>
+                    <a:p>
+                      <a:pPr>
+                        <a:defRPr sz="1050"/>
+                      </a:pPr>
+                      <a:r>
+                        <a:t>Not Clinically Relevant</a:t>
+                      </a:r>
+                    </a:p>
+                  </a:txBody>
+                  <a:tcPr/>
+                </a:tc>
+              </a:tr>
+              <a:tr h="195942">
+                <a:tc>
+                  <a:txBody>
+                    <a:bodyPr/>
+                    <a:lstStyle/>
+                    <a:p>
+                      <a:pPr>
+                        <a:defRPr sz="1050"/>
+                      </a:pPr>
+                      <a:r>
+                        <a:t>ql-xii-61</a:t>
+                      </a:r>
+                    </a:p>
+                  </a:txBody>
+                  <a:tcPr/>
+                </a:tc>
+                <a:tc>
+                  <a:txBody>
+                    <a:bodyPr/>
+                    <a:lstStyle/>
+                    <a:p>
+                      <a:pPr>
+                        <a:defRPr sz="1050"/>
+                      </a:pPr>
+                      <a:r>
+                        <a:t>0.59</a:t>
+                      </a:r>
+                    </a:p>
+                  </a:txBody>
+                  <a:tcPr/>
+                </a:tc>
+                <a:tc>
+                  <a:txBody>
+                    <a:bodyPr/>
+                    <a:lstStyle/>
+                    <a:p>
+                      <a:pPr>
+                        <a:defRPr sz="1050"/>
+                      </a:pPr>
+                      <a:r>
+                        <a:t>+..</a:t>
+                      </a:r>
+                    </a:p>
+                  </a:txBody>
+                  <a:tcPr/>
+                </a:tc>
+                <a:tc>
+                  <a:txBody>
+                    <a:bodyPr/>
+                    <a:lstStyle/>
+                    <a:p>
+                      <a:pPr>
+                        <a:defRPr sz="1050"/>
+                      </a:pPr>
+                      <a:r>
+                        <a:t>Not Clinically Relevant</a:t>
+                      </a:r>
+                    </a:p>
+                  </a:txBody>
+                  <a:tcPr/>
+                </a:tc>
+              </a:tr>
+              <a:tr h="195942">
+                <a:tc>
+                  <a:txBody>
+                    <a:bodyPr/>
+                    <a:lstStyle/>
+                    <a:p>
+                      <a:pPr>
+                        <a:defRPr sz="1050"/>
+                      </a:pPr>
+                      <a:r>
+                        <a:t>linsitinib</a:t>
+                      </a:r>
+                    </a:p>
+                  </a:txBody>
+                  <a:tcPr/>
+                </a:tc>
+                <a:tc>
+                  <a:txBody>
+                    <a:bodyPr/>
+                    <a:lstStyle/>
+                    <a:p>
+                      <a:pPr>
+                        <a:defRPr sz="1050"/>
+                      </a:pPr>
+                      <a:r>
+                        <a:t>0.55</a:t>
+                      </a:r>
+                    </a:p>
+                  </a:txBody>
+                  <a:tcPr/>
+                </a:tc>
+                <a:tc>
+                  <a:txBody>
+                    <a:bodyPr/>
+                    <a:lstStyle/>
+                    <a:p>
+                      <a:pPr>
+                        <a:defRPr sz="1050"/>
+                      </a:pPr>
+                      <a:r>
+                        <a:t>++.</a:t>
+                      </a:r>
+                    </a:p>
+                  </a:txBody>
+                  <a:tcPr/>
+                </a:tc>
+                <a:tc>
+                  <a:txBody>
+                    <a:bodyPr/>
+                    <a:lstStyle/>
+                    <a:p>
+                      <a:pPr>
+                        <a:defRPr sz="1050"/>
+                      </a:pPr>
+                      <a:r>
+                        <a:t>IGF-1R inhibitor</a:t>
+                      </a:r>
+                    </a:p>
+                  </a:txBody>
+                  <a:tcPr/>
+                </a:tc>
+              </a:tr>
+              <a:tr h="195942">
+                <a:tc>
+                  <a:txBody>
+                    <a:bodyPr/>
+                    <a:lstStyle/>
+                    <a:p>
+                      <a:pPr>
+                        <a:defRPr sz="1050"/>
+                      </a:pPr>
+                      <a:r>
+                        <a:t>gw-2580</a:t>
+                      </a:r>
+                    </a:p>
+                  </a:txBody>
+                  <a:tcPr/>
+                </a:tc>
+                <a:tc>
+                  <a:txBody>
+                    <a:bodyPr/>
+                    <a:lstStyle/>
+                    <a:p>
+                      <a:pPr>
+                        <a:defRPr sz="1050"/>
+                      </a:pPr>
+                      <a:r>
+                        <a:t>0.55</a:t>
+                      </a:r>
+                    </a:p>
+                  </a:txBody>
+                  <a:tcPr/>
+                </a:tc>
+                <a:tc>
+                  <a:txBody>
+                    <a:bodyPr/>
+                    <a:lstStyle/>
+                    <a:p>
+                      <a:pPr>
+                        <a:defRPr sz="1050"/>
+                      </a:pPr>
+                      <a:r>
+                        <a:t>+..</a:t>
+                      </a:r>
+                    </a:p>
+                  </a:txBody>
+                  <a:tcPr/>
+                </a:tc>
+                <a:tc>
+                  <a:txBody>
+                    <a:bodyPr/>
+                    <a:lstStyle/>
+                    <a:p>
+                      <a:pPr>
+                        <a:defRPr sz="1050"/>
+                      </a:pPr>
+                      <a:r>
+                        <a:t>Not Clinically Relevant</a:t>
+                      </a:r>
+                    </a:p>
+                  </a:txBody>
+                  <a:tcPr/>
+                </a:tc>
+              </a:tr>
+              <a:tr h="195942">
+                <a:tc>
+                  <a:txBody>
+                    <a:bodyPr/>
+                    <a:lstStyle/>
+                    <a:p>
+                      <a:pPr>
+                        <a:defRPr sz="1050"/>
+                      </a:pPr>
+                      <a:r>
+                        <a:t>gsk429286a</a:t>
+                      </a:r>
+                    </a:p>
+                  </a:txBody>
+                  <a:tcPr/>
+                </a:tc>
+                <a:tc>
+                  <a:txBody>
+                    <a:bodyPr/>
+                    <a:lstStyle/>
+                    <a:p>
+                      <a:pPr>
+                        <a:defRPr sz="1050"/>
+                      </a:pPr>
+                      <a:r>
+                        <a:t>0.55</a:t>
+                      </a:r>
+                    </a:p>
+                  </a:txBody>
+                  <a:tcPr/>
+                </a:tc>
+                <a:tc>
+                  <a:txBody>
+                    <a:bodyPr/>
+                    <a:lstStyle/>
+                    <a:p>
+                      <a:pPr>
+                        <a:defRPr sz="1050"/>
+                      </a:pPr>
+                      <a:r>
+                        <a:t>+..</a:t>
+                      </a:r>
+                    </a:p>
+                  </a:txBody>
+                  <a:tcPr/>
+                </a:tc>
+                <a:tc>
+                  <a:txBody>
+                    <a:bodyPr/>
+                    <a:lstStyle/>
+                    <a:p>
+                      <a:pPr>
+                        <a:defRPr sz="1050"/>
+                      </a:pPr>
+                      <a:r>
+                        <a:t>Not Clinically Relevant</a:t>
+                      </a:r>
+                    </a:p>
+                  </a:txBody>
+                  <a:tcPr/>
+                </a:tc>
+              </a:tr>
+              <a:tr h="195942">
+                <a:tc>
+                  <a:txBody>
+                    <a:bodyPr/>
+                    <a:lstStyle/>
+                    <a:p>
+                      <a:pPr>
+                        <a:defRPr sz="1050"/>
+                      </a:pPr>
+                      <a:r>
+                        <a:t>tubastatin a</a:t>
+                      </a:r>
+                    </a:p>
+                  </a:txBody>
+                  <a:tcPr/>
+                </a:tc>
+                <a:tc>
+                  <a:txBody>
+                    <a:bodyPr/>
+                    <a:lstStyle/>
+                    <a:p>
+                      <a:pPr>
+                        <a:defRPr sz="1050"/>
+                      </a:pPr>
+                      <a:r>
+                        <a:t>0.54</a:t>
+                      </a:r>
+                    </a:p>
+                  </a:txBody>
+                  <a:tcPr/>
+                </a:tc>
+                <a:tc>
+                  <a:txBody>
+                    <a:bodyPr/>
+                    <a:lstStyle/>
+                    <a:p>
+                      <a:pPr>
+                        <a:defRPr sz="1050"/>
+                      </a:pPr>
+                      <a:r>
+                        <a:t>++.</a:t>
+                      </a:r>
+                    </a:p>
+                  </a:txBody>
+                  <a:tcPr/>
+                </a:tc>
+                <a:tc>
+                  <a:txBody>
+                    <a:bodyPr/>
+                    <a:lstStyle/>
+                    <a:p>
+                      <a:pPr>
+                        <a:defRPr sz="1050"/>
+                      </a:pPr>
+                      <a:r>
+                        <a:t>Not Clinically Relevant</a:t>
+                      </a:r>
+                    </a:p>
+                  </a:txBody>
+                  <a:tcPr/>
+                </a:tc>
+              </a:tr>
+              <a:tr h="195942">
+                <a:tc>
+                  <a:txBody>
+                    <a:bodyPr/>
+                    <a:lstStyle/>
+                    <a:p>
+                      <a:pPr>
+                        <a:defRPr sz="1050"/>
+                      </a:pPr>
+                      <a:r>
+                        <a:t>bx-912</a:t>
+                      </a:r>
+                    </a:p>
+                  </a:txBody>
+                  <a:tcPr/>
+                </a:tc>
+                <a:tc>
+                  <a:txBody>
+                    <a:bodyPr/>
+                    <a:lstStyle/>
+                    <a:p>
+                      <a:pPr>
+                        <a:defRPr sz="1050"/>
+                      </a:pPr>
+                      <a:r>
+                        <a:t>0.54</a:t>
+                      </a:r>
+                    </a:p>
+                  </a:txBody>
+                  <a:tcPr/>
+                </a:tc>
+                <a:tc>
+                  <a:txBody>
+                    <a:bodyPr/>
+                    <a:lstStyle/>
+                    <a:p>
+                      <a:pPr>
+                        <a:defRPr sz="1050"/>
+                      </a:pPr>
+                      <a:r>
+                        <a:t>+..</a:t>
+                      </a:r>
+                    </a:p>
+                  </a:txBody>
+                  <a:tcPr/>
+                </a:tc>
+                <a:tc>
+                  <a:txBody>
+                    <a:bodyPr/>
+                    <a:lstStyle/>
+                    <a:p>
+                      <a:pPr>
+                        <a:defRPr sz="1050"/>
+                      </a:pPr>
+                      <a:r>
+                        <a:t>Not Clinically Relevant</a:t>
+                      </a:r>
+                    </a:p>
+                  </a:txBody>
+                  <a:tcPr/>
+                </a:tc>
+              </a:tr>
+              <a:tr h="195942">
+                <a:tc>
+                  <a:txBody>
+                    <a:bodyPr/>
+                    <a:lstStyle/>
+                    <a:p>
+                      <a:pPr>
+                        <a:defRPr sz="1050"/>
+                      </a:pPr>
+                      <a:r>
+                        <a:t>vx-702</a:t>
+                      </a:r>
+                    </a:p>
+                  </a:txBody>
+                  <a:tcPr/>
+                </a:tc>
+                <a:tc>
+                  <a:txBody>
+                    <a:bodyPr/>
+                    <a:lstStyle/>
+                    <a:p>
+                      <a:pPr>
+                        <a:defRPr sz="1050"/>
+                      </a:pPr>
+                      <a:r>
+                        <a:t>0.53</a:t>
+                      </a:r>
+                    </a:p>
+                  </a:txBody>
+                  <a:tcPr/>
+                </a:tc>
+                <a:tc>
+                  <a:txBody>
+                    <a:bodyPr/>
+                    <a:lstStyle/>
+                    <a:p>
+                      <a:pPr>
+                        <a:defRPr sz="1050"/>
+                      </a:pPr>
+                      <a:r>
+                        <a:t>+..</a:t>
+                      </a:r>
+                    </a:p>
+                  </a:txBody>
+                  <a:tcPr/>
+                </a:tc>
+                <a:tc>
+                  <a:txBody>
+                    <a:bodyPr/>
+                    <a:lstStyle/>
+                    <a:p>
+                      <a:pPr>
+                        <a:defRPr sz="1050"/>
+                      </a:pPr>
+                      <a:r>
+                        <a:t>Not Clinically Relevant</a:t>
+                      </a:r>
+                    </a:p>
+                  </a:txBody>
+                  <a:tcPr/>
+                </a:tc>
+              </a:tr>
+              <a:tr h="195942">
+                <a:tc>
+                  <a:txBody>
+                    <a:bodyPr/>
+                    <a:lstStyle/>
+                    <a:p>
+                      <a:pPr>
+                        <a:defRPr sz="1050"/>
+                      </a:pPr>
+                      <a:r>
+                        <a:t>rucaparib</a:t>
+                      </a:r>
+                    </a:p>
+                  </a:txBody>
+                  <a:tcPr/>
+                </a:tc>
+                <a:tc>
+                  <a:txBody>
+                    <a:bodyPr/>
+                    <a:lstStyle/>
+                    <a:p>
+                      <a:pPr>
+                        <a:defRPr sz="1050"/>
+                      </a:pPr>
+                      <a:r>
+                        <a:t>0.52</a:t>
+                      </a:r>
+                    </a:p>
+                  </a:txBody>
+                  <a:tcPr/>
+                </a:tc>
+                <a:tc>
+                  <a:txBody>
+                    <a:bodyPr/>
+                    <a:lstStyle/>
+                    <a:p>
+                      <a:pPr>
+                        <a:defRPr sz="1050"/>
+                      </a:pPr>
+                      <a:r>
+                        <a:t>+..</a:t>
+                      </a:r>
+                    </a:p>
+                  </a:txBody>
+                  <a:tcPr/>
+                </a:tc>
+                <a:tc>
+                  <a:txBody>
+                    <a:bodyPr/>
+                    <a:lstStyle/>
+                    <a:p>
+                      <a:pPr>
+                        <a:defRPr sz="1050"/>
+                      </a:pPr>
+                      <a:r>
+                        <a:t>PARP inhibitor, inhibits DNA repair</a:t>
+                      </a:r>
+                    </a:p>
+                  </a:txBody>
+                  <a:tcPr/>
+                </a:tc>
+              </a:tr>
+              <a:tr h="195942">
+                <a:tc>
+                  <a:txBody>
+                    <a:bodyPr/>
+                    <a:lstStyle/>
+                    <a:p>
+                      <a:pPr>
+                        <a:defRPr sz="1050"/>
+                      </a:pPr>
+                      <a:r>
+                        <a:t>navitoclax</a:t>
+                      </a:r>
+                    </a:p>
+                  </a:txBody>
+                  <a:tcPr/>
+                </a:tc>
+                <a:tc>
+                  <a:txBody>
+                    <a:bodyPr/>
+                    <a:lstStyle/>
+                    <a:p>
+                      <a:pPr>
+                        <a:defRPr sz="1050"/>
+                      </a:pPr>
+                      <a:r>
+                        <a:t>0.51</a:t>
+                      </a:r>
+                    </a:p>
+                  </a:txBody>
+                  <a:tcPr/>
+                </a:tc>
+                <a:tc>
+                  <a:txBody>
+                    <a:bodyPr/>
+                    <a:lstStyle/>
+                    <a:p>
+                      <a:pPr>
+                        <a:defRPr sz="1050"/>
+                      </a:pPr>
+                      <a:r>
+                        <a:t>++.</a:t>
+                      </a:r>
+                    </a:p>
+                  </a:txBody>
+                  <a:tcPr/>
+                </a:tc>
+                <a:tc>
+                  <a:txBody>
+                    <a:bodyPr/>
+                    <a:lstStyle/>
+                    <a:p>
+                      <a:pPr>
+                        <a:defRPr sz="1050"/>
+                      </a:pPr>
+                      <a:r>
+                        <a:t>Bcl-2 family inhibitor: esp Bcl-xL, Bcl-2 and Bcl-w</a:t>
+                      </a:r>
+                    </a:p>
+                  </a:txBody>
+                  <a:tcPr/>
+                </a:tc>
+              </a:tr>
+              <a:tr h="195942">
+                <a:tc>
+                  <a:txBody>
+                    <a:bodyPr/>
+                    <a:lstStyle/>
+                    <a:p>
+                      <a:pPr>
+                        <a:defRPr sz="1050"/>
+                      </a:pPr>
+                      <a:r>
+                        <a:t>xmd14-99</a:t>
+                      </a:r>
+                    </a:p>
+                  </a:txBody>
+                  <a:tcPr/>
+                </a:tc>
+                <a:tc>
+                  <a:txBody>
+                    <a:bodyPr/>
+                    <a:lstStyle/>
+                    <a:p>
+                      <a:pPr>
+                        <a:defRPr sz="1050"/>
+                      </a:pPr>
+                      <a:r>
+                        <a:t>0.48</a:t>
+                      </a:r>
+                    </a:p>
+                  </a:txBody>
+                  <a:tcPr/>
+                </a:tc>
+                <a:tc>
+                  <a:txBody>
+                    <a:bodyPr/>
+                    <a:lstStyle/>
+                    <a:p>
+                      <a:pPr>
+                        <a:defRPr sz="1050"/>
+                      </a:pPr>
+                      <a:r>
+                        <a:t>+..</a:t>
+                      </a:r>
+                    </a:p>
+                  </a:txBody>
+                  <a:tcPr/>
+                </a:tc>
+                <a:tc>
+                  <a:txBody>
+                    <a:bodyPr/>
+                    <a:lstStyle/>
+                    <a:p>
+                      <a:pPr>
+                        <a:defRPr sz="1050"/>
+                      </a:pPr>
+                      <a:r>
+                        <a:t>Not Clinically Relevant</a:t>
+                      </a:r>
+                    </a:p>
+                  </a:txBody>
+                  <a:tcPr/>
+                </a:tc>
+              </a:tr>
+              <a:tr h="195942">
+                <a:tc>
+                  <a:txBody>
+                    <a:bodyPr/>
+                    <a:lstStyle/>
+                    <a:p>
+                      <a:pPr>
+                        <a:defRPr sz="1050"/>
+                      </a:pPr>
+                      <a:r>
+                        <a:t>axitinib</a:t>
+                      </a:r>
+                    </a:p>
+                  </a:txBody>
+                  <a:tcPr/>
+                </a:tc>
+                <a:tc>
+                  <a:txBody>
+                    <a:bodyPr/>
+                    <a:lstStyle/>
+                    <a:p>
+                      <a:pPr>
+                        <a:defRPr sz="1050"/>
+                      </a:pPr>
+                      <a:r>
+                        <a:t>0.47</a:t>
+                      </a:r>
+                    </a:p>
+                  </a:txBody>
+                  <a:tcPr/>
+                </a:tc>
+                <a:tc>
+                  <a:txBody>
+                    <a:bodyPr/>
+                    <a:lstStyle/>
+                    <a:p>
+                      <a:pPr>
+                        <a:defRPr sz="1050"/>
+                      </a:pPr>
+                      <a:r>
+                        <a:t>++.</a:t>
+                      </a:r>
+                    </a:p>
+                  </a:txBody>
+                  <a:tcPr/>
+                </a:tc>
+                <a:tc>
+                  <a:txBody>
+                    <a:bodyPr/>
+                    <a:lstStyle/>
+                    <a:p>
+                      <a:pPr>
+                        <a:defRPr sz="1050"/>
+                      </a:pPr>
+                      <a:r>
+                        <a:t>VEGFR, c-KIT and PDGFR inhibitor</a:t>
+                      </a:r>
+                    </a:p>
+                  </a:txBody>
+                  <a:tcPr/>
+                </a:tc>
+              </a:tr>
+              <a:tr h="195942">
+                <a:tc>
+                  <a:txBody>
+                    <a:bodyPr/>
+                    <a:lstStyle/>
+                    <a:p>
+                      <a:pPr>
+                        <a:defRPr sz="1050"/>
+                      </a:pPr>
+                      <a:r>
+                        <a:t>hg-5-88-01</a:t>
+                      </a:r>
+                    </a:p>
+                  </a:txBody>
+                  <a:tcPr/>
+                </a:tc>
+                <a:tc>
+                  <a:txBody>
+                    <a:bodyPr/>
+                    <a:lstStyle/>
+                    <a:p>
+                      <a:pPr>
+                        <a:defRPr sz="1050"/>
+                      </a:pPr>
+                      <a:r>
+                        <a:t>0.47</a:t>
+                      </a:r>
+                    </a:p>
+                  </a:txBody>
+                  <a:tcPr/>
+                </a:tc>
+                <a:tc>
+                  <a:txBody>
+                    <a:bodyPr/>
+                    <a:lstStyle/>
+                    <a:p>
+                      <a:pPr>
+                        <a:defRPr sz="1050"/>
+                      </a:pPr>
+                      <a:r>
+                        <a:t>+..</a:t>
+                      </a:r>
+                    </a:p>
+                  </a:txBody>
+                  <a:tcPr/>
+                </a:tc>
+                <a:tc>
+                  <a:txBody>
+                    <a:bodyPr/>
+                    <a:lstStyle/>
+                    <a:p>
+                      <a:pPr>
+                        <a:defRPr sz="1050"/>
+                      </a:pPr>
+                      <a:r>
+                        <a:t>Not Clinically Relevant</a:t>
+                      </a:r>
+                    </a:p>
+                  </a:txBody>
+                  <a:tcPr/>
+                </a:tc>
+              </a:tr>
+              <a:tr h="195942">
+                <a:tc>
+                  <a:txBody>
+                    <a:bodyPr/>
+                    <a:lstStyle/>
+                    <a:p>
+                      <a:pPr>
+                        <a:defRPr sz="1050"/>
+                      </a:pPr>
+                      <a:r>
+                        <a:t>amuvatinib</a:t>
+                      </a:r>
+                    </a:p>
+                  </a:txBody>
+                  <a:tcPr/>
+                </a:tc>
+                <a:tc>
+                  <a:txBody>
+                    <a:bodyPr/>
+                    <a:lstStyle/>
+                    <a:p>
+                      <a:pPr>
+                        <a:defRPr sz="1050"/>
+                      </a:pPr>
+                      <a:r>
+                        <a:t>0.46</a:t>
+                      </a:r>
+                    </a:p>
+                  </a:txBody>
+                  <a:tcPr/>
+                </a:tc>
+                <a:tc>
+                  <a:txBody>
+                    <a:bodyPr/>
+                    <a:lstStyle/>
+                    <a:p>
+                      <a:pPr>
+                        <a:defRPr sz="1050"/>
+                      </a:pPr>
+                      <a:r>
+                        <a:t>+..</a:t>
+                      </a:r>
+                    </a:p>
+                  </a:txBody>
+                  <a:tcPr/>
+                </a:tc>
+                <a:tc>
+                  <a:txBody>
+                    <a:bodyPr/>
+                    <a:lstStyle/>
+                    <a:p>
+                      <a:pPr>
+                        <a:defRPr sz="1050"/>
+                      </a:pPr>
+                      <a:r>
+                        <a:t>Not Clinically Relevant</a:t>
+                      </a:r>
+                    </a:p>
+                  </a:txBody>
+                  <a:tcPr/>
+                </a:tc>
+              </a:tr>
+              <a:tr h="195942">
+                <a:tc>
+                  <a:txBody>
+                    <a:bodyPr/>
+                    <a:lstStyle/>
+                    <a:p>
+                      <a:pPr>
+                        <a:defRPr sz="1050"/>
+                      </a:pPr>
+                      <a:r>
+                        <a:t>xmd13-2</a:t>
+                      </a:r>
+                    </a:p>
+                  </a:txBody>
+                  <a:tcPr/>
+                </a:tc>
+                <a:tc>
+                  <a:txBody>
+                    <a:bodyPr/>
+                    <a:lstStyle/>
+                    <a:p>
+                      <a:pPr>
+                        <a:defRPr sz="1050"/>
+                      </a:pPr>
+                      <a:r>
+                        <a:t>0.45</a:t>
+                      </a:r>
+                    </a:p>
+                  </a:txBody>
+                  <a:tcPr/>
+                </a:tc>
+                <a:tc>
+                  <a:txBody>
+                    <a:bodyPr/>
+                    <a:lstStyle/>
+                    <a:p>
+                      <a:pPr>
+                        <a:defRPr sz="1050"/>
+                      </a:pPr>
+                      <a:r>
+                        <a:t>+..</a:t>
+                      </a:r>
+                    </a:p>
+                  </a:txBody>
+                  <a:tcPr/>
+                </a:tc>
+                <a:tc>
+                  <a:txBody>
+                    <a:bodyPr/>
+                    <a:lstStyle/>
+                    <a:p>
+                      <a:pPr>
+                        <a:defRPr sz="1050"/>
+                      </a:pPr>
+                      <a:r>
+                        <a:t>Not Clinically Relevant</a:t>
+                      </a:r>
+                    </a:p>
+                  </a:txBody>
+                  <a:tcPr/>
+                </a:tc>
+              </a:tr>
+              <a:tr h="195942">
+                <a:tc>
+                  <a:txBody>
+                    <a:bodyPr/>
+                    <a:lstStyle/>
+                    <a:p>
+                      <a:pPr>
+                        <a:defRPr sz="1050"/>
+                      </a:pPr>
+                      <a:r>
+                        <a:t>indisulam</a:t>
+                      </a:r>
+                    </a:p>
+                  </a:txBody>
+                  <a:tcPr/>
+                </a:tc>
+                <a:tc>
+                  <a:txBody>
+                    <a:bodyPr/>
+                    <a:lstStyle/>
+                    <a:p>
+                      <a:pPr>
+                        <a:defRPr sz="1050"/>
+                      </a:pPr>
+                      <a:r>
+                        <a:t>0.44</a:t>
+                      </a:r>
+                    </a:p>
+                  </a:txBody>
+                  <a:tcPr/>
+                </a:tc>
+                <a:tc>
+                  <a:txBody>
+                    <a:bodyPr/>
+                    <a:lstStyle/>
+                    <a:p>
+                      <a:pPr>
+                        <a:defRPr sz="1050"/>
+                      </a:pPr>
+                      <a:r>
+                        <a:t>.+.</a:t>
+                      </a:r>
+                    </a:p>
+                  </a:txBody>
+                  <a:tcPr/>
+                </a:tc>
+                <a:tc>
+                  <a:txBody>
+                    <a:bodyPr/>
+                    <a:lstStyle/>
+                    <a:p>
+                      <a:pPr>
+                        <a:defRPr sz="1050"/>
+                      </a:pPr>
+                      <a:r>
+                        <a:t>carbonic anhydrase inibitor and  CDK inhibitor, targets G1 by depleting cyclin E. inducing p53 and p21, and inhibiting CDK2</a:t>
+                      </a:r>
+                    </a:p>
+                  </a:txBody>
+                  <a:tcPr/>
+                </a:tc>
+              </a:tr>
+              <a:tr h="195942">
+                <a:tc>
+                  <a:txBody>
+                    <a:bodyPr/>
+                    <a:lstStyle/>
+                    <a:p>
+                      <a:pPr>
+                        <a:defRPr sz="1050"/>
+                      </a:pPr>
+                      <a:r>
+                        <a:t>nsc-87877</a:t>
+                      </a:r>
+                    </a:p>
+                  </a:txBody>
+                  <a:tcPr/>
+                </a:tc>
+                <a:tc>
+                  <a:txBody>
+                    <a:bodyPr/>
+                    <a:lstStyle/>
+                    <a:p>
+                      <a:pPr>
+                        <a:defRPr sz="1050"/>
+                      </a:pPr>
+                      <a:r>
+                        <a:t>0.43</a:t>
+                      </a:r>
+                    </a:p>
+                  </a:txBody>
+                  <a:tcPr/>
+                </a:tc>
+                <a:tc>
+                  <a:txBody>
+                    <a:bodyPr/>
+                    <a:lstStyle/>
+                    <a:p>
+                      <a:pPr>
+                        <a:defRPr sz="1050"/>
+                      </a:pPr>
+                      <a:r>
+                        <a:t>+..</a:t>
+                      </a:r>
+                    </a:p>
+                  </a:txBody>
+                  <a:tcPr/>
+                </a:tc>
+                <a:tc>
+                  <a:txBody>
+                    <a:bodyPr/>
+                    <a:lstStyle/>
+                    <a:p>
+                      <a:pPr>
+                        <a:defRPr sz="1050"/>
+                      </a:pPr>
+                      <a:r>
+                        <a:t>Not Clinically Relevant</a:t>
+                      </a:r>
+                    </a:p>
+                  </a:txBody>
+                  <a:tcPr/>
+                </a:tc>
+              </a:tr>
+              <a:tr h="195960">
+                <a:tc>
+                  <a:txBody>
+                    <a:bodyPr/>
+                    <a:lstStyle/>
+                    <a:p>
+                      <a:pPr>
+                        <a:defRPr sz="1050"/>
+                      </a:pPr>
+                      <a:r>
+                        <a:t>cil55</a:t>
+                      </a:r>
+                    </a:p>
+                  </a:txBody>
+                  <a:tcPr/>
+                </a:tc>
+                <a:tc>
+                  <a:txBody>
+                    <a:bodyPr/>
+                    <a:lstStyle/>
+                    <a:p>
+                      <a:pPr>
+                        <a:defRPr sz="1050"/>
+                      </a:pPr>
+                      <a:r>
+                        <a:t>0.43</a:t>
+                      </a:r>
+                    </a:p>
+                  </a:txBody>
+                  <a:tcPr/>
+                </a:tc>
+                <a:tc>
+                  <a:txBody>
+                    <a:bodyPr/>
+                    <a:lstStyle/>
+                    <a:p>
+                      <a:pPr>
+                        <a:defRPr sz="1050"/>
+                      </a:pPr>
+                      <a:r>
+                        <a:t>.+.</a:t>
+                      </a:r>
+                    </a:p>
+                  </a:txBody>
+                  <a:tcPr/>
+                </a:tc>
+                <a:tc>
+                  <a:txBody>
+                    <a:bodyPr/>
+                    <a:lstStyle/>
+                    <a:p>
+                      <a:pPr>
+                        <a:defRPr sz="1050"/>
+                      </a:pPr>
+                      <a:r>
+                        <a:t>Not Clinically Relevant</a:t>
+                      </a:r>
+                    </a:p>
+                  </a:txBody>
+                  <a:tcPr/>
+                </a:tc>
+              </a:tr>
+            </a:tbl>
+          </a:graphicData>
+        </a:graphic>
+      </p:graphicFrame>
+    </p:spTree>
+  </p:cSld>
+  <p:clrMapOvr>
+    <a:masterClrMapping/>
+  </p:clrMapOvr>
+</p:sld>
+</file>
+
 <file path=ppt/slides/slide4.xml><?xml version="1.0" encoding="utf-8"?>
 <p:sld xmlns:a="http://schemas.openxmlformats.org/drawingml/2006/main" xmlns:p="http://schemas.openxmlformats.org/presentationml/2006/main" xmlns:r="http://schemas.openxmlformats.org/officeDocument/2006/relationships">
   <p:cSld>

</xml_diff>

<commit_message>
step_2 updated and reran
</commit_message>
<xml_diff>
--- a/Notebooks/patients/BT084/BT084.mtb_slides.pptx
+++ b/Notebooks/patients/BT084/BT084.mtb_slides.pptx
@@ -42,6 +42,7 @@
     <p:sldId id="290" r:id="rId41"/>
     <p:sldId id="291" r:id="rId42"/>
     <p:sldId id="292" r:id="rId43"/>
+    <p:sldId id="293" r:id="rId44"/>
   </p:sldIdLst>
   <p:sldSz cx="9144000" cy="6858000" type="screen4x3"/>
   <p:notesSz cx="6858000" cy="9144000"/>
@@ -49213,6 +49214,1374 @@
 </p:sld>
 </file>
 
+<file path=ppt/slides/slide38.xml><?xml version="1.0" encoding="utf-8"?>
+<p:sld xmlns:a="http://schemas.openxmlformats.org/drawingml/2006/main" xmlns:p="http://schemas.openxmlformats.org/presentationml/2006/main" xmlns:r="http://schemas.openxmlformats.org/officeDocument/2006/relationships">
+  <p:cSld>
+    <p:spTree>
+      <p:nvGrpSpPr>
+        <p:cNvPr id="1" name=""/>
+        <p:cNvGrpSpPr/>
+        <p:nvPr/>
+      </p:nvGrpSpPr>
+      <p:grpSpPr/>
+      <p:sp>
+        <p:nvSpPr>
+          <p:cNvPr id="2" name="TextBox 1"/>
+          <p:cNvSpPr txBox="1"/>
+          <p:nvPr/>
+        </p:nvSpPr>
+        <p:spPr>
+          <a:xfrm>
+            <a:off x="0" y="0"/>
+            <a:ext cx="9144000" cy="685800"/>
+          </a:xfrm>
+          <a:prstGeom prst="rect">
+            <a:avLst/>
+          </a:prstGeom>
+          <a:noFill/>
+        </p:spPr>
+        <p:txBody>
+          <a:bodyPr wrap="none">
+            <a:spAutoFit/>
+          </a:bodyPr>
+          <a:lstStyle/>
+          <a:p/>
+          <a:p>
+            <a:pPr>
+              <a:defRPr sz="2600"/>
+            </a:pPr>
+            <a:r>
+              <a:t>DiSCoVER: top drugs (cerebellar stem cell control)</a:t>
+            </a:r>
+          </a:p>
+        </p:txBody>
+      </p:sp>
+      <p:graphicFrame>
+        <p:nvGraphicFramePr>
+          <p:cNvPr id="3" name="Table 2"/>
+          <p:cNvGraphicFramePr>
+            <a:graphicFrameLocks noGrp="1"/>
+          </p:cNvGraphicFramePr>
+          <p:nvPr/>
+        </p:nvGraphicFramePr>
+        <p:xfrm>
+          <a:off x="411480" y="777240"/>
+          <a:ext cx="8275320" cy="4114800"/>
+        </p:xfrm>
+        <a:graphic>
+          <a:graphicData uri="http://schemas.openxmlformats.org/drawingml/2006/table">
+            <a:tbl>
+              <a:tblPr firstRow="1" bandRow="1">
+                <a:tableStyleId>{5C22544A-7EE6-4342-B048-85BDC9FD1C3A}</a:tableStyleId>
+              </a:tblPr>
+              <a:tblGrid>
+                <a:gridCol w="1005840"/>
+                <a:gridCol w="731520"/>
+                <a:gridCol w="1051560"/>
+                <a:gridCol w="5486400"/>
+              </a:tblGrid>
+              <a:tr h="195942">
+                <a:tc>
+                  <a:txBody>
+                    <a:bodyPr/>
+                    <a:lstStyle/>
+                    <a:p>
+                      <a:r>
+                        <a:t>Drug</a:t>
+                      </a:r>
+                    </a:p>
+                  </a:txBody>
+                  <a:tcPr/>
+                </a:tc>
+                <a:tc>
+                  <a:txBody>
+                    <a:bodyPr/>
+                    <a:lstStyle/>
+                    <a:p>
+                      <a:r>
+                        <a:t>Score</a:t>
+                      </a:r>
+                    </a:p>
+                  </a:txBody>
+                  <a:tcPr/>
+                </a:tc>
+                <a:tc>
+                  <a:txBody>
+                    <a:bodyPr/>
+                    <a:lstStyle/>
+                    <a:p>
+                      <a:r>
+                        <a:t>Evidence</a:t>
+                      </a:r>
+                    </a:p>
+                  </a:txBody>
+                  <a:tcPr/>
+                </a:tc>
+                <a:tc>
+                  <a:txBody>
+                    <a:bodyPr/>
+                    <a:lstStyle/>
+                    <a:p>
+                      <a:r>
+                        <a:t>Mechanism of action</a:t>
+                      </a:r>
+                    </a:p>
+                  </a:txBody>
+                  <a:tcPr/>
+                </a:tc>
+              </a:tr>
+              <a:tr h="195942">
+                <a:tc>
+                  <a:txBody>
+                    <a:bodyPr/>
+                    <a:lstStyle/>
+                    <a:p>
+                      <a:pPr>
+                        <a:defRPr sz="1050"/>
+                      </a:pPr>
+                      <a:r>
+                        <a:t>tl-2-105</a:t>
+                      </a:r>
+                    </a:p>
+                  </a:txBody>
+                  <a:tcPr/>
+                </a:tc>
+                <a:tc>
+                  <a:txBody>
+                    <a:bodyPr/>
+                    <a:lstStyle/>
+                    <a:p>
+                      <a:pPr>
+                        <a:defRPr sz="1050"/>
+                      </a:pPr>
+                      <a:r>
+                        <a:t>0.65</a:t>
+                      </a:r>
+                    </a:p>
+                  </a:txBody>
+                  <a:tcPr/>
+                </a:tc>
+                <a:tc>
+                  <a:txBody>
+                    <a:bodyPr/>
+                    <a:lstStyle/>
+                    <a:p>
+                      <a:pPr>
+                        <a:defRPr sz="1050"/>
+                      </a:pPr>
+                      <a:r>
+                        <a:t>+..</a:t>
+                      </a:r>
+                    </a:p>
+                  </a:txBody>
+                  <a:tcPr/>
+                </a:tc>
+                <a:tc>
+                  <a:txBody>
+                    <a:bodyPr/>
+                    <a:lstStyle/>
+                    <a:p>
+                      <a:pPr>
+                        <a:defRPr sz="1050"/>
+                      </a:pPr>
+                      <a:r>
+                        <a:t>Not Clinically Relevant</a:t>
+                      </a:r>
+                    </a:p>
+                  </a:txBody>
+                  <a:tcPr/>
+                </a:tc>
+              </a:tr>
+              <a:tr h="195942">
+                <a:tc>
+                  <a:txBody>
+                    <a:bodyPr/>
+                    <a:lstStyle/>
+                    <a:p>
+                      <a:pPr>
+                        <a:defRPr sz="1050"/>
+                      </a:pPr>
+                      <a:r>
+                        <a:t>sb52334</a:t>
+                      </a:r>
+                    </a:p>
+                  </a:txBody>
+                  <a:tcPr/>
+                </a:tc>
+                <a:tc>
+                  <a:txBody>
+                    <a:bodyPr/>
+                    <a:lstStyle/>
+                    <a:p>
+                      <a:pPr>
+                        <a:defRPr sz="1050"/>
+                      </a:pPr>
+                      <a:r>
+                        <a:t>0.62</a:t>
+                      </a:r>
+                    </a:p>
+                  </a:txBody>
+                  <a:tcPr/>
+                </a:tc>
+                <a:tc>
+                  <a:txBody>
+                    <a:bodyPr/>
+                    <a:lstStyle/>
+                    <a:p>
+                      <a:pPr>
+                        <a:defRPr sz="1050"/>
+                      </a:pPr>
+                      <a:r>
+                        <a:t>+..</a:t>
+                      </a:r>
+                    </a:p>
+                  </a:txBody>
+                  <a:tcPr/>
+                </a:tc>
+                <a:tc>
+                  <a:txBody>
+                    <a:bodyPr/>
+                    <a:lstStyle/>
+                    <a:p>
+                      <a:pPr>
+                        <a:defRPr sz="1050"/>
+                      </a:pPr>
+                      <a:r>
+                        <a:t>Not Clinically Relevant</a:t>
+                      </a:r>
+                    </a:p>
+                  </a:txBody>
+                  <a:tcPr/>
+                </a:tc>
+              </a:tr>
+              <a:tr h="195942">
+                <a:tc>
+                  <a:txBody>
+                    <a:bodyPr/>
+                    <a:lstStyle/>
+                    <a:p>
+                      <a:pPr>
+                        <a:defRPr sz="1050"/>
+                      </a:pPr>
+                      <a:r>
+                        <a:t>gsk1070916</a:t>
+                      </a:r>
+                    </a:p>
+                  </a:txBody>
+                  <a:tcPr/>
+                </a:tc>
+                <a:tc>
+                  <a:txBody>
+                    <a:bodyPr/>
+                    <a:lstStyle/>
+                    <a:p>
+                      <a:pPr>
+                        <a:defRPr sz="1050"/>
+                      </a:pPr>
+                      <a:r>
+                        <a:t>0.61</a:t>
+                      </a:r>
+                    </a:p>
+                  </a:txBody>
+                  <a:tcPr/>
+                </a:tc>
+                <a:tc>
+                  <a:txBody>
+                    <a:bodyPr/>
+                    <a:lstStyle/>
+                    <a:p>
+                      <a:pPr>
+                        <a:defRPr sz="1050"/>
+                      </a:pPr>
+                      <a:r>
+                        <a:t>+..</a:t>
+                      </a:r>
+                    </a:p>
+                  </a:txBody>
+                  <a:tcPr/>
+                </a:tc>
+                <a:tc>
+                  <a:txBody>
+                    <a:bodyPr/>
+                    <a:lstStyle/>
+                    <a:p>
+                      <a:pPr>
+                        <a:defRPr sz="1050"/>
+                      </a:pPr>
+                      <a:r>
+                        <a:t>Not Clinically Relevant</a:t>
+                      </a:r>
+                    </a:p>
+                  </a:txBody>
+                  <a:tcPr/>
+                </a:tc>
+              </a:tr>
+              <a:tr h="195942">
+                <a:tc>
+                  <a:txBody>
+                    <a:bodyPr/>
+                    <a:lstStyle/>
+                    <a:p>
+                      <a:pPr>
+                        <a:defRPr sz="1050"/>
+                      </a:pPr>
+                      <a:r>
+                        <a:t>ql-xii-61</a:t>
+                      </a:r>
+                    </a:p>
+                  </a:txBody>
+                  <a:tcPr/>
+                </a:tc>
+                <a:tc>
+                  <a:txBody>
+                    <a:bodyPr/>
+                    <a:lstStyle/>
+                    <a:p>
+                      <a:pPr>
+                        <a:defRPr sz="1050"/>
+                      </a:pPr>
+                      <a:r>
+                        <a:t>0.59</a:t>
+                      </a:r>
+                    </a:p>
+                  </a:txBody>
+                  <a:tcPr/>
+                </a:tc>
+                <a:tc>
+                  <a:txBody>
+                    <a:bodyPr/>
+                    <a:lstStyle/>
+                    <a:p>
+                      <a:pPr>
+                        <a:defRPr sz="1050"/>
+                      </a:pPr>
+                      <a:r>
+                        <a:t>+..</a:t>
+                      </a:r>
+                    </a:p>
+                  </a:txBody>
+                  <a:tcPr/>
+                </a:tc>
+                <a:tc>
+                  <a:txBody>
+                    <a:bodyPr/>
+                    <a:lstStyle/>
+                    <a:p>
+                      <a:pPr>
+                        <a:defRPr sz="1050"/>
+                      </a:pPr>
+                      <a:r>
+                        <a:t>Not Clinically Relevant</a:t>
+                      </a:r>
+                    </a:p>
+                  </a:txBody>
+                  <a:tcPr/>
+                </a:tc>
+              </a:tr>
+              <a:tr h="195942">
+                <a:tc>
+                  <a:txBody>
+                    <a:bodyPr/>
+                    <a:lstStyle/>
+                    <a:p>
+                      <a:pPr>
+                        <a:defRPr sz="1050"/>
+                      </a:pPr>
+                      <a:r>
+                        <a:t>linsitinib</a:t>
+                      </a:r>
+                    </a:p>
+                  </a:txBody>
+                  <a:tcPr/>
+                </a:tc>
+                <a:tc>
+                  <a:txBody>
+                    <a:bodyPr/>
+                    <a:lstStyle/>
+                    <a:p>
+                      <a:pPr>
+                        <a:defRPr sz="1050"/>
+                      </a:pPr>
+                      <a:r>
+                        <a:t>0.55</a:t>
+                      </a:r>
+                    </a:p>
+                  </a:txBody>
+                  <a:tcPr/>
+                </a:tc>
+                <a:tc>
+                  <a:txBody>
+                    <a:bodyPr/>
+                    <a:lstStyle/>
+                    <a:p>
+                      <a:pPr>
+                        <a:defRPr sz="1050"/>
+                      </a:pPr>
+                      <a:r>
+                        <a:t>++.</a:t>
+                      </a:r>
+                    </a:p>
+                  </a:txBody>
+                  <a:tcPr/>
+                </a:tc>
+                <a:tc>
+                  <a:txBody>
+                    <a:bodyPr/>
+                    <a:lstStyle/>
+                    <a:p>
+                      <a:pPr>
+                        <a:defRPr sz="1050"/>
+                      </a:pPr>
+                      <a:r>
+                        <a:t>IGF-1R inhibitor</a:t>
+                      </a:r>
+                    </a:p>
+                  </a:txBody>
+                  <a:tcPr/>
+                </a:tc>
+              </a:tr>
+              <a:tr h="195942">
+                <a:tc>
+                  <a:txBody>
+                    <a:bodyPr/>
+                    <a:lstStyle/>
+                    <a:p>
+                      <a:pPr>
+                        <a:defRPr sz="1050"/>
+                      </a:pPr>
+                      <a:r>
+                        <a:t>gw-2580</a:t>
+                      </a:r>
+                    </a:p>
+                  </a:txBody>
+                  <a:tcPr/>
+                </a:tc>
+                <a:tc>
+                  <a:txBody>
+                    <a:bodyPr/>
+                    <a:lstStyle/>
+                    <a:p>
+                      <a:pPr>
+                        <a:defRPr sz="1050"/>
+                      </a:pPr>
+                      <a:r>
+                        <a:t>0.55</a:t>
+                      </a:r>
+                    </a:p>
+                  </a:txBody>
+                  <a:tcPr/>
+                </a:tc>
+                <a:tc>
+                  <a:txBody>
+                    <a:bodyPr/>
+                    <a:lstStyle/>
+                    <a:p>
+                      <a:pPr>
+                        <a:defRPr sz="1050"/>
+                      </a:pPr>
+                      <a:r>
+                        <a:t>+..</a:t>
+                      </a:r>
+                    </a:p>
+                  </a:txBody>
+                  <a:tcPr/>
+                </a:tc>
+                <a:tc>
+                  <a:txBody>
+                    <a:bodyPr/>
+                    <a:lstStyle/>
+                    <a:p>
+                      <a:pPr>
+                        <a:defRPr sz="1050"/>
+                      </a:pPr>
+                      <a:r>
+                        <a:t>Not Clinically Relevant</a:t>
+                      </a:r>
+                    </a:p>
+                  </a:txBody>
+                  <a:tcPr/>
+                </a:tc>
+              </a:tr>
+              <a:tr h="195942">
+                <a:tc>
+                  <a:txBody>
+                    <a:bodyPr/>
+                    <a:lstStyle/>
+                    <a:p>
+                      <a:pPr>
+                        <a:defRPr sz="1050"/>
+                      </a:pPr>
+                      <a:r>
+                        <a:t>gsk429286a</a:t>
+                      </a:r>
+                    </a:p>
+                  </a:txBody>
+                  <a:tcPr/>
+                </a:tc>
+                <a:tc>
+                  <a:txBody>
+                    <a:bodyPr/>
+                    <a:lstStyle/>
+                    <a:p>
+                      <a:pPr>
+                        <a:defRPr sz="1050"/>
+                      </a:pPr>
+                      <a:r>
+                        <a:t>0.55</a:t>
+                      </a:r>
+                    </a:p>
+                  </a:txBody>
+                  <a:tcPr/>
+                </a:tc>
+                <a:tc>
+                  <a:txBody>
+                    <a:bodyPr/>
+                    <a:lstStyle/>
+                    <a:p>
+                      <a:pPr>
+                        <a:defRPr sz="1050"/>
+                      </a:pPr>
+                      <a:r>
+                        <a:t>+..</a:t>
+                      </a:r>
+                    </a:p>
+                  </a:txBody>
+                  <a:tcPr/>
+                </a:tc>
+                <a:tc>
+                  <a:txBody>
+                    <a:bodyPr/>
+                    <a:lstStyle/>
+                    <a:p>
+                      <a:pPr>
+                        <a:defRPr sz="1050"/>
+                      </a:pPr>
+                      <a:r>
+                        <a:t>Not Clinically Relevant</a:t>
+                      </a:r>
+                    </a:p>
+                  </a:txBody>
+                  <a:tcPr/>
+                </a:tc>
+              </a:tr>
+              <a:tr h="195942">
+                <a:tc>
+                  <a:txBody>
+                    <a:bodyPr/>
+                    <a:lstStyle/>
+                    <a:p>
+                      <a:pPr>
+                        <a:defRPr sz="1050"/>
+                      </a:pPr>
+                      <a:r>
+                        <a:t>tubastatin a</a:t>
+                      </a:r>
+                    </a:p>
+                  </a:txBody>
+                  <a:tcPr/>
+                </a:tc>
+                <a:tc>
+                  <a:txBody>
+                    <a:bodyPr/>
+                    <a:lstStyle/>
+                    <a:p>
+                      <a:pPr>
+                        <a:defRPr sz="1050"/>
+                      </a:pPr>
+                      <a:r>
+                        <a:t>0.54</a:t>
+                      </a:r>
+                    </a:p>
+                  </a:txBody>
+                  <a:tcPr/>
+                </a:tc>
+                <a:tc>
+                  <a:txBody>
+                    <a:bodyPr/>
+                    <a:lstStyle/>
+                    <a:p>
+                      <a:pPr>
+                        <a:defRPr sz="1050"/>
+                      </a:pPr>
+                      <a:r>
+                        <a:t>++.</a:t>
+                      </a:r>
+                    </a:p>
+                  </a:txBody>
+                  <a:tcPr/>
+                </a:tc>
+                <a:tc>
+                  <a:txBody>
+                    <a:bodyPr/>
+                    <a:lstStyle/>
+                    <a:p>
+                      <a:pPr>
+                        <a:defRPr sz="1050"/>
+                      </a:pPr>
+                      <a:r>
+                        <a:t>Not Clinically Relevant</a:t>
+                      </a:r>
+                    </a:p>
+                  </a:txBody>
+                  <a:tcPr/>
+                </a:tc>
+              </a:tr>
+              <a:tr h="195942">
+                <a:tc>
+                  <a:txBody>
+                    <a:bodyPr/>
+                    <a:lstStyle/>
+                    <a:p>
+                      <a:pPr>
+                        <a:defRPr sz="1050"/>
+                      </a:pPr>
+                      <a:r>
+                        <a:t>bx-912</a:t>
+                      </a:r>
+                    </a:p>
+                  </a:txBody>
+                  <a:tcPr/>
+                </a:tc>
+                <a:tc>
+                  <a:txBody>
+                    <a:bodyPr/>
+                    <a:lstStyle/>
+                    <a:p>
+                      <a:pPr>
+                        <a:defRPr sz="1050"/>
+                      </a:pPr>
+                      <a:r>
+                        <a:t>0.54</a:t>
+                      </a:r>
+                    </a:p>
+                  </a:txBody>
+                  <a:tcPr/>
+                </a:tc>
+                <a:tc>
+                  <a:txBody>
+                    <a:bodyPr/>
+                    <a:lstStyle/>
+                    <a:p>
+                      <a:pPr>
+                        <a:defRPr sz="1050"/>
+                      </a:pPr>
+                      <a:r>
+                        <a:t>+..</a:t>
+                      </a:r>
+                    </a:p>
+                  </a:txBody>
+                  <a:tcPr/>
+                </a:tc>
+                <a:tc>
+                  <a:txBody>
+                    <a:bodyPr/>
+                    <a:lstStyle/>
+                    <a:p>
+                      <a:pPr>
+                        <a:defRPr sz="1050"/>
+                      </a:pPr>
+                      <a:r>
+                        <a:t>Not Clinically Relevant</a:t>
+                      </a:r>
+                    </a:p>
+                  </a:txBody>
+                  <a:tcPr/>
+                </a:tc>
+              </a:tr>
+              <a:tr h="195942">
+                <a:tc>
+                  <a:txBody>
+                    <a:bodyPr/>
+                    <a:lstStyle/>
+                    <a:p>
+                      <a:pPr>
+                        <a:defRPr sz="1050"/>
+                      </a:pPr>
+                      <a:r>
+                        <a:t>vx-702</a:t>
+                      </a:r>
+                    </a:p>
+                  </a:txBody>
+                  <a:tcPr/>
+                </a:tc>
+                <a:tc>
+                  <a:txBody>
+                    <a:bodyPr/>
+                    <a:lstStyle/>
+                    <a:p>
+                      <a:pPr>
+                        <a:defRPr sz="1050"/>
+                      </a:pPr>
+                      <a:r>
+                        <a:t>0.53</a:t>
+                      </a:r>
+                    </a:p>
+                  </a:txBody>
+                  <a:tcPr/>
+                </a:tc>
+                <a:tc>
+                  <a:txBody>
+                    <a:bodyPr/>
+                    <a:lstStyle/>
+                    <a:p>
+                      <a:pPr>
+                        <a:defRPr sz="1050"/>
+                      </a:pPr>
+                      <a:r>
+                        <a:t>+..</a:t>
+                      </a:r>
+                    </a:p>
+                  </a:txBody>
+                  <a:tcPr/>
+                </a:tc>
+                <a:tc>
+                  <a:txBody>
+                    <a:bodyPr/>
+                    <a:lstStyle/>
+                    <a:p>
+                      <a:pPr>
+                        <a:defRPr sz="1050"/>
+                      </a:pPr>
+                      <a:r>
+                        <a:t>Not Clinically Relevant</a:t>
+                      </a:r>
+                    </a:p>
+                  </a:txBody>
+                  <a:tcPr/>
+                </a:tc>
+              </a:tr>
+              <a:tr h="195942">
+                <a:tc>
+                  <a:txBody>
+                    <a:bodyPr/>
+                    <a:lstStyle/>
+                    <a:p>
+                      <a:pPr>
+                        <a:defRPr sz="1050"/>
+                      </a:pPr>
+                      <a:r>
+                        <a:t>rucaparib</a:t>
+                      </a:r>
+                    </a:p>
+                  </a:txBody>
+                  <a:tcPr/>
+                </a:tc>
+                <a:tc>
+                  <a:txBody>
+                    <a:bodyPr/>
+                    <a:lstStyle/>
+                    <a:p>
+                      <a:pPr>
+                        <a:defRPr sz="1050"/>
+                      </a:pPr>
+                      <a:r>
+                        <a:t>0.52</a:t>
+                      </a:r>
+                    </a:p>
+                  </a:txBody>
+                  <a:tcPr/>
+                </a:tc>
+                <a:tc>
+                  <a:txBody>
+                    <a:bodyPr/>
+                    <a:lstStyle/>
+                    <a:p>
+                      <a:pPr>
+                        <a:defRPr sz="1050"/>
+                      </a:pPr>
+                      <a:r>
+                        <a:t>+..</a:t>
+                      </a:r>
+                    </a:p>
+                  </a:txBody>
+                  <a:tcPr/>
+                </a:tc>
+                <a:tc>
+                  <a:txBody>
+                    <a:bodyPr/>
+                    <a:lstStyle/>
+                    <a:p>
+                      <a:pPr>
+                        <a:defRPr sz="1050"/>
+                      </a:pPr>
+                      <a:r>
+                        <a:t>PARP inhibitor, inhibits DNA repair</a:t>
+                      </a:r>
+                    </a:p>
+                  </a:txBody>
+                  <a:tcPr/>
+                </a:tc>
+              </a:tr>
+              <a:tr h="195942">
+                <a:tc>
+                  <a:txBody>
+                    <a:bodyPr/>
+                    <a:lstStyle/>
+                    <a:p>
+                      <a:pPr>
+                        <a:defRPr sz="1050"/>
+                      </a:pPr>
+                      <a:r>
+                        <a:t>navitoclax</a:t>
+                      </a:r>
+                    </a:p>
+                  </a:txBody>
+                  <a:tcPr/>
+                </a:tc>
+                <a:tc>
+                  <a:txBody>
+                    <a:bodyPr/>
+                    <a:lstStyle/>
+                    <a:p>
+                      <a:pPr>
+                        <a:defRPr sz="1050"/>
+                      </a:pPr>
+                      <a:r>
+                        <a:t>0.51</a:t>
+                      </a:r>
+                    </a:p>
+                  </a:txBody>
+                  <a:tcPr/>
+                </a:tc>
+                <a:tc>
+                  <a:txBody>
+                    <a:bodyPr/>
+                    <a:lstStyle/>
+                    <a:p>
+                      <a:pPr>
+                        <a:defRPr sz="1050"/>
+                      </a:pPr>
+                      <a:r>
+                        <a:t>++.</a:t>
+                      </a:r>
+                    </a:p>
+                  </a:txBody>
+                  <a:tcPr/>
+                </a:tc>
+                <a:tc>
+                  <a:txBody>
+                    <a:bodyPr/>
+                    <a:lstStyle/>
+                    <a:p>
+                      <a:pPr>
+                        <a:defRPr sz="1050"/>
+                      </a:pPr>
+                      <a:r>
+                        <a:t>Bcl-2 family inhibitor: esp Bcl-xL, Bcl-2 and Bcl-w</a:t>
+                      </a:r>
+                    </a:p>
+                  </a:txBody>
+                  <a:tcPr/>
+                </a:tc>
+              </a:tr>
+              <a:tr h="195942">
+                <a:tc>
+                  <a:txBody>
+                    <a:bodyPr/>
+                    <a:lstStyle/>
+                    <a:p>
+                      <a:pPr>
+                        <a:defRPr sz="1050"/>
+                      </a:pPr>
+                      <a:r>
+                        <a:t>xmd14-99</a:t>
+                      </a:r>
+                    </a:p>
+                  </a:txBody>
+                  <a:tcPr/>
+                </a:tc>
+                <a:tc>
+                  <a:txBody>
+                    <a:bodyPr/>
+                    <a:lstStyle/>
+                    <a:p>
+                      <a:pPr>
+                        <a:defRPr sz="1050"/>
+                      </a:pPr>
+                      <a:r>
+                        <a:t>0.48</a:t>
+                      </a:r>
+                    </a:p>
+                  </a:txBody>
+                  <a:tcPr/>
+                </a:tc>
+                <a:tc>
+                  <a:txBody>
+                    <a:bodyPr/>
+                    <a:lstStyle/>
+                    <a:p>
+                      <a:pPr>
+                        <a:defRPr sz="1050"/>
+                      </a:pPr>
+                      <a:r>
+                        <a:t>+..</a:t>
+                      </a:r>
+                    </a:p>
+                  </a:txBody>
+                  <a:tcPr/>
+                </a:tc>
+                <a:tc>
+                  <a:txBody>
+                    <a:bodyPr/>
+                    <a:lstStyle/>
+                    <a:p>
+                      <a:pPr>
+                        <a:defRPr sz="1050"/>
+                      </a:pPr>
+                      <a:r>
+                        <a:t>Not Clinically Relevant</a:t>
+                      </a:r>
+                    </a:p>
+                  </a:txBody>
+                  <a:tcPr/>
+                </a:tc>
+              </a:tr>
+              <a:tr h="195942">
+                <a:tc>
+                  <a:txBody>
+                    <a:bodyPr/>
+                    <a:lstStyle/>
+                    <a:p>
+                      <a:pPr>
+                        <a:defRPr sz="1050"/>
+                      </a:pPr>
+                      <a:r>
+                        <a:t>axitinib</a:t>
+                      </a:r>
+                    </a:p>
+                  </a:txBody>
+                  <a:tcPr/>
+                </a:tc>
+                <a:tc>
+                  <a:txBody>
+                    <a:bodyPr/>
+                    <a:lstStyle/>
+                    <a:p>
+                      <a:pPr>
+                        <a:defRPr sz="1050"/>
+                      </a:pPr>
+                      <a:r>
+                        <a:t>0.47</a:t>
+                      </a:r>
+                    </a:p>
+                  </a:txBody>
+                  <a:tcPr/>
+                </a:tc>
+                <a:tc>
+                  <a:txBody>
+                    <a:bodyPr/>
+                    <a:lstStyle/>
+                    <a:p>
+                      <a:pPr>
+                        <a:defRPr sz="1050"/>
+                      </a:pPr>
+                      <a:r>
+                        <a:t>++.</a:t>
+                      </a:r>
+                    </a:p>
+                  </a:txBody>
+                  <a:tcPr/>
+                </a:tc>
+                <a:tc>
+                  <a:txBody>
+                    <a:bodyPr/>
+                    <a:lstStyle/>
+                    <a:p>
+                      <a:pPr>
+                        <a:defRPr sz="1050"/>
+                      </a:pPr>
+                      <a:r>
+                        <a:t>VEGFR, c-KIT and PDGFR inhibitor</a:t>
+                      </a:r>
+                    </a:p>
+                  </a:txBody>
+                  <a:tcPr/>
+                </a:tc>
+              </a:tr>
+              <a:tr h="195942">
+                <a:tc>
+                  <a:txBody>
+                    <a:bodyPr/>
+                    <a:lstStyle/>
+                    <a:p>
+                      <a:pPr>
+                        <a:defRPr sz="1050"/>
+                      </a:pPr>
+                      <a:r>
+                        <a:t>hg-5-88-01</a:t>
+                      </a:r>
+                    </a:p>
+                  </a:txBody>
+                  <a:tcPr/>
+                </a:tc>
+                <a:tc>
+                  <a:txBody>
+                    <a:bodyPr/>
+                    <a:lstStyle/>
+                    <a:p>
+                      <a:pPr>
+                        <a:defRPr sz="1050"/>
+                      </a:pPr>
+                      <a:r>
+                        <a:t>0.47</a:t>
+                      </a:r>
+                    </a:p>
+                  </a:txBody>
+                  <a:tcPr/>
+                </a:tc>
+                <a:tc>
+                  <a:txBody>
+                    <a:bodyPr/>
+                    <a:lstStyle/>
+                    <a:p>
+                      <a:pPr>
+                        <a:defRPr sz="1050"/>
+                      </a:pPr>
+                      <a:r>
+                        <a:t>+..</a:t>
+                      </a:r>
+                    </a:p>
+                  </a:txBody>
+                  <a:tcPr/>
+                </a:tc>
+                <a:tc>
+                  <a:txBody>
+                    <a:bodyPr/>
+                    <a:lstStyle/>
+                    <a:p>
+                      <a:pPr>
+                        <a:defRPr sz="1050"/>
+                      </a:pPr>
+                      <a:r>
+                        <a:t>Not Clinically Relevant</a:t>
+                      </a:r>
+                    </a:p>
+                  </a:txBody>
+                  <a:tcPr/>
+                </a:tc>
+              </a:tr>
+              <a:tr h="195942">
+                <a:tc>
+                  <a:txBody>
+                    <a:bodyPr/>
+                    <a:lstStyle/>
+                    <a:p>
+                      <a:pPr>
+                        <a:defRPr sz="1050"/>
+                      </a:pPr>
+                      <a:r>
+                        <a:t>amuvatinib</a:t>
+                      </a:r>
+                    </a:p>
+                  </a:txBody>
+                  <a:tcPr/>
+                </a:tc>
+                <a:tc>
+                  <a:txBody>
+                    <a:bodyPr/>
+                    <a:lstStyle/>
+                    <a:p>
+                      <a:pPr>
+                        <a:defRPr sz="1050"/>
+                      </a:pPr>
+                      <a:r>
+                        <a:t>0.46</a:t>
+                      </a:r>
+                    </a:p>
+                  </a:txBody>
+                  <a:tcPr/>
+                </a:tc>
+                <a:tc>
+                  <a:txBody>
+                    <a:bodyPr/>
+                    <a:lstStyle/>
+                    <a:p>
+                      <a:pPr>
+                        <a:defRPr sz="1050"/>
+                      </a:pPr>
+                      <a:r>
+                        <a:t>+..</a:t>
+                      </a:r>
+                    </a:p>
+                  </a:txBody>
+                  <a:tcPr/>
+                </a:tc>
+                <a:tc>
+                  <a:txBody>
+                    <a:bodyPr/>
+                    <a:lstStyle/>
+                    <a:p>
+                      <a:pPr>
+                        <a:defRPr sz="1050"/>
+                      </a:pPr>
+                      <a:r>
+                        <a:t>Not Clinically Relevant</a:t>
+                      </a:r>
+                    </a:p>
+                  </a:txBody>
+                  <a:tcPr/>
+                </a:tc>
+              </a:tr>
+              <a:tr h="195942">
+                <a:tc>
+                  <a:txBody>
+                    <a:bodyPr/>
+                    <a:lstStyle/>
+                    <a:p>
+                      <a:pPr>
+                        <a:defRPr sz="1050"/>
+                      </a:pPr>
+                      <a:r>
+                        <a:t>xmd13-2</a:t>
+                      </a:r>
+                    </a:p>
+                  </a:txBody>
+                  <a:tcPr/>
+                </a:tc>
+                <a:tc>
+                  <a:txBody>
+                    <a:bodyPr/>
+                    <a:lstStyle/>
+                    <a:p>
+                      <a:pPr>
+                        <a:defRPr sz="1050"/>
+                      </a:pPr>
+                      <a:r>
+                        <a:t>0.45</a:t>
+                      </a:r>
+                    </a:p>
+                  </a:txBody>
+                  <a:tcPr/>
+                </a:tc>
+                <a:tc>
+                  <a:txBody>
+                    <a:bodyPr/>
+                    <a:lstStyle/>
+                    <a:p>
+                      <a:pPr>
+                        <a:defRPr sz="1050"/>
+                      </a:pPr>
+                      <a:r>
+                        <a:t>+..</a:t>
+                      </a:r>
+                    </a:p>
+                  </a:txBody>
+                  <a:tcPr/>
+                </a:tc>
+                <a:tc>
+                  <a:txBody>
+                    <a:bodyPr/>
+                    <a:lstStyle/>
+                    <a:p>
+                      <a:pPr>
+                        <a:defRPr sz="1050"/>
+                      </a:pPr>
+                      <a:r>
+                        <a:t>Not Clinically Relevant</a:t>
+                      </a:r>
+                    </a:p>
+                  </a:txBody>
+                  <a:tcPr/>
+                </a:tc>
+              </a:tr>
+              <a:tr h="195942">
+                <a:tc>
+                  <a:txBody>
+                    <a:bodyPr/>
+                    <a:lstStyle/>
+                    <a:p>
+                      <a:pPr>
+                        <a:defRPr sz="1050"/>
+                      </a:pPr>
+                      <a:r>
+                        <a:t>indisulam</a:t>
+                      </a:r>
+                    </a:p>
+                  </a:txBody>
+                  <a:tcPr/>
+                </a:tc>
+                <a:tc>
+                  <a:txBody>
+                    <a:bodyPr/>
+                    <a:lstStyle/>
+                    <a:p>
+                      <a:pPr>
+                        <a:defRPr sz="1050"/>
+                      </a:pPr>
+                      <a:r>
+                        <a:t>0.44</a:t>
+                      </a:r>
+                    </a:p>
+                  </a:txBody>
+                  <a:tcPr/>
+                </a:tc>
+                <a:tc>
+                  <a:txBody>
+                    <a:bodyPr/>
+                    <a:lstStyle/>
+                    <a:p>
+                      <a:pPr>
+                        <a:defRPr sz="1050"/>
+                      </a:pPr>
+                      <a:r>
+                        <a:t>.+.</a:t>
+                      </a:r>
+                    </a:p>
+                  </a:txBody>
+                  <a:tcPr/>
+                </a:tc>
+                <a:tc>
+                  <a:txBody>
+                    <a:bodyPr/>
+                    <a:lstStyle/>
+                    <a:p>
+                      <a:pPr>
+                        <a:defRPr sz="1050"/>
+                      </a:pPr>
+                      <a:r>
+                        <a:t>carbonic anhydrase inibitor and  CDK inhibitor, targets G1 by depleting cyclin E. inducing p53 and p21, and inhibiting CDK2</a:t>
+                      </a:r>
+                    </a:p>
+                  </a:txBody>
+                  <a:tcPr/>
+                </a:tc>
+              </a:tr>
+              <a:tr h="195942">
+                <a:tc>
+                  <a:txBody>
+                    <a:bodyPr/>
+                    <a:lstStyle/>
+                    <a:p>
+                      <a:pPr>
+                        <a:defRPr sz="1050"/>
+                      </a:pPr>
+                      <a:r>
+                        <a:t>nsc-87877</a:t>
+                      </a:r>
+                    </a:p>
+                  </a:txBody>
+                  <a:tcPr/>
+                </a:tc>
+                <a:tc>
+                  <a:txBody>
+                    <a:bodyPr/>
+                    <a:lstStyle/>
+                    <a:p>
+                      <a:pPr>
+                        <a:defRPr sz="1050"/>
+                      </a:pPr>
+                      <a:r>
+                        <a:t>0.43</a:t>
+                      </a:r>
+                    </a:p>
+                  </a:txBody>
+                  <a:tcPr/>
+                </a:tc>
+                <a:tc>
+                  <a:txBody>
+                    <a:bodyPr/>
+                    <a:lstStyle/>
+                    <a:p>
+                      <a:pPr>
+                        <a:defRPr sz="1050"/>
+                      </a:pPr>
+                      <a:r>
+                        <a:t>+..</a:t>
+                      </a:r>
+                    </a:p>
+                  </a:txBody>
+                  <a:tcPr/>
+                </a:tc>
+                <a:tc>
+                  <a:txBody>
+                    <a:bodyPr/>
+                    <a:lstStyle/>
+                    <a:p>
+                      <a:pPr>
+                        <a:defRPr sz="1050"/>
+                      </a:pPr>
+                      <a:r>
+                        <a:t>Not Clinically Relevant</a:t>
+                      </a:r>
+                    </a:p>
+                  </a:txBody>
+                  <a:tcPr/>
+                </a:tc>
+              </a:tr>
+              <a:tr h="195960">
+                <a:tc>
+                  <a:txBody>
+                    <a:bodyPr/>
+                    <a:lstStyle/>
+                    <a:p>
+                      <a:pPr>
+                        <a:defRPr sz="1050"/>
+                      </a:pPr>
+                      <a:r>
+                        <a:t>cil55</a:t>
+                      </a:r>
+                    </a:p>
+                  </a:txBody>
+                  <a:tcPr/>
+                </a:tc>
+                <a:tc>
+                  <a:txBody>
+                    <a:bodyPr/>
+                    <a:lstStyle/>
+                    <a:p>
+                      <a:pPr>
+                        <a:defRPr sz="1050"/>
+                      </a:pPr>
+                      <a:r>
+                        <a:t>0.43</a:t>
+                      </a:r>
+                    </a:p>
+                  </a:txBody>
+                  <a:tcPr/>
+                </a:tc>
+                <a:tc>
+                  <a:txBody>
+                    <a:bodyPr/>
+                    <a:lstStyle/>
+                    <a:p>
+                      <a:pPr>
+                        <a:defRPr sz="1050"/>
+                      </a:pPr>
+                      <a:r>
+                        <a:t>.+.</a:t>
+                      </a:r>
+                    </a:p>
+                  </a:txBody>
+                  <a:tcPr/>
+                </a:tc>
+                <a:tc>
+                  <a:txBody>
+                    <a:bodyPr/>
+                    <a:lstStyle/>
+                    <a:p>
+                      <a:pPr>
+                        <a:defRPr sz="1050"/>
+                      </a:pPr>
+                      <a:r>
+                        <a:t>Not Clinically Relevant</a:t>
+                      </a:r>
+                    </a:p>
+                  </a:txBody>
+                  <a:tcPr/>
+                </a:tc>
+              </a:tr>
+            </a:tbl>
+          </a:graphicData>
+        </a:graphic>
+      </p:graphicFrame>
+    </p:spTree>
+  </p:cSld>
+  <p:clrMapOvr>
+    <a:masterClrMapping/>
+  </p:clrMapOvr>
+</p:sld>
+</file>
+
 <file path=ppt/slides/slide4.xml><?xml version="1.0" encoding="utf-8"?>
 <p:sld xmlns:a="http://schemas.openxmlformats.org/drawingml/2006/main" xmlns:p="http://schemas.openxmlformats.org/presentationml/2006/main" xmlns:r="http://schemas.openxmlformats.org/officeDocument/2006/relationships">
   <p:cSld>

</xml_diff>